<commit_message>
New logos and images
</commit_message>
<xml_diff>
--- a/doc/_static/logo/pysmlib_logo.pptx
+++ b/doc/_static/logo/pysmlib_logo.pptx
@@ -6,6 +6,8 @@
   </p:sldMasterIdLst>
   <p:sldIdLst>
     <p:sldId id="256" r:id="rId2"/>
+    <p:sldId id="257" r:id="rId3"/>
+    <p:sldId id="258" r:id="rId4"/>
   </p:sldIdLst>
   <p:sldSz cx="12192000" cy="6858000"/>
   <p:notesSz cx="6858000" cy="9144000"/>
@@ -104,7 +106,447 @@
       </a:defRPr>
     </a:lvl9pPr>
   </p:defaultTextStyle>
+  <p:extLst>
+    <p:ext uri="{EFAFB233-063F-42B5-8137-9DF3F51BA10A}">
+      <p15:sldGuideLst xmlns:p15="http://schemas.microsoft.com/office/powerpoint/2012/main"/>
+    </p:ext>
+  </p:extLst>
 </p:presentation>
+</file>
+
+<file path=ppt/revisionInfo.xml><?xml version="1.0" encoding="utf-8"?>
+<p1510:revInfo xmlns:a="http://schemas.openxmlformats.org/drawingml/2006/main" xmlns:r="http://schemas.openxmlformats.org/officeDocument/2006/relationships" xmlns:p1510="http://schemas.microsoft.com/office/powerpoint/2015/10/main">
+  <p1510:revLst>
+    <p1510:client id="{DC4604E9-7B38-405A-BD50-36055A4D10DD}" v="253" dt="2018-08-22T12:57:56.644"/>
+  </p1510:revLst>
+</p1510:revInfo>
+</file>
+
+<file path=ppt/changesInfos/changesInfo1.xml><?xml version="1.0" encoding="utf-8"?>
+<pc:chgInfo xmlns:a="http://schemas.openxmlformats.org/drawingml/2006/main" xmlns:r="http://schemas.openxmlformats.org/officeDocument/2006/relationships" xmlns:ac="http://schemas.microsoft.com/office/drawing/2013/main/command" xmlns:pc="http://schemas.microsoft.com/office/powerpoint/2013/main/command">
+  <pc:docChgLst>
+    <pc:chgData name="Davide Marcato" userId="e8fd52e3-1508-44a4-af20-03021de06d73" providerId="ADAL" clId="{DC4604E9-7B38-405A-BD50-36055A4D10DD}"/>
+    <pc:docChg chg="undo custSel addSld modSld modMainMaster">
+      <pc:chgData name="Davide Marcato" userId="e8fd52e3-1508-44a4-af20-03021de06d73" providerId="ADAL" clId="{DC4604E9-7B38-405A-BD50-36055A4D10DD}" dt="2018-08-22T12:57:56.643" v="250"/>
+      <pc:docMkLst>
+        <pc:docMk/>
+      </pc:docMkLst>
+      <pc:sldChg chg="addSp delSp modSp setBg">
+        <pc:chgData name="Davide Marcato" userId="e8fd52e3-1508-44a4-af20-03021de06d73" providerId="ADAL" clId="{DC4604E9-7B38-405A-BD50-36055A4D10DD}" dt="2018-08-22T12:57:56.643" v="250"/>
+        <pc:sldMkLst>
+          <pc:docMk/>
+          <pc:sldMk cId="525818786" sldId="257"/>
+        </pc:sldMkLst>
+        <pc:spChg chg="del">
+          <ac:chgData name="Davide Marcato" userId="e8fd52e3-1508-44a4-af20-03021de06d73" providerId="ADAL" clId="{DC4604E9-7B38-405A-BD50-36055A4D10DD}" dt="2018-08-22T12:34:18.144" v="4" actId="478"/>
+          <ac:spMkLst>
+            <pc:docMk/>
+            <pc:sldMk cId="525818786" sldId="257"/>
+            <ac:spMk id="7" creationId="{05C12E3F-851A-4EEC-9B22-996C306E570E}"/>
+          </ac:spMkLst>
+        </pc:spChg>
+        <pc:spChg chg="mod">
+          <ac:chgData name="Davide Marcato" userId="e8fd52e3-1508-44a4-af20-03021de06d73" providerId="ADAL" clId="{DC4604E9-7B38-405A-BD50-36055A4D10DD}" dt="2018-08-22T12:35:50.578" v="22" actId="1076"/>
+          <ac:spMkLst>
+            <pc:docMk/>
+            <pc:sldMk cId="525818786" sldId="257"/>
+            <ac:spMk id="8" creationId="{BF36A2FE-6FEA-4A83-82A1-23334F10D52D}"/>
+          </ac:spMkLst>
+        </pc:spChg>
+        <pc:spChg chg="del">
+          <ac:chgData name="Davide Marcato" userId="e8fd52e3-1508-44a4-af20-03021de06d73" providerId="ADAL" clId="{DC4604E9-7B38-405A-BD50-36055A4D10DD}" dt="2018-08-22T12:34:27.888" v="11" actId="478"/>
+          <ac:spMkLst>
+            <pc:docMk/>
+            <pc:sldMk cId="525818786" sldId="257"/>
+            <ac:spMk id="9" creationId="{AF3125F1-74F0-4380-A2C1-5C5FA6EB9C42}"/>
+          </ac:spMkLst>
+        </pc:spChg>
+        <pc:spChg chg="del">
+          <ac:chgData name="Davide Marcato" userId="e8fd52e3-1508-44a4-af20-03021de06d73" providerId="ADAL" clId="{DC4604E9-7B38-405A-BD50-36055A4D10DD}" dt="2018-08-22T12:34:19.787" v="5" actId="478"/>
+          <ac:spMkLst>
+            <pc:docMk/>
+            <pc:sldMk cId="525818786" sldId="257"/>
+            <ac:spMk id="10" creationId="{68E774B8-4E07-42CD-8168-223AD351828A}"/>
+          </ac:spMkLst>
+        </pc:spChg>
+        <pc:spChg chg="add mod ord">
+          <ac:chgData name="Davide Marcato" userId="e8fd52e3-1508-44a4-af20-03021de06d73" providerId="ADAL" clId="{DC4604E9-7B38-405A-BD50-36055A4D10DD}" dt="2018-08-22T12:36:04.605" v="24" actId="170"/>
+          <ac:spMkLst>
+            <pc:docMk/>
+            <pc:sldMk cId="525818786" sldId="257"/>
+            <ac:spMk id="11" creationId="{1B9351D4-601B-4FEA-A785-9CCD38C8C6F2}"/>
+          </ac:spMkLst>
+        </pc:spChg>
+        <pc:spChg chg="add del mod">
+          <ac:chgData name="Davide Marcato" userId="e8fd52e3-1508-44a4-af20-03021de06d73" providerId="ADAL" clId="{DC4604E9-7B38-405A-BD50-36055A4D10DD}" dt="2018-08-22T12:34:22.025" v="7" actId="478"/>
+          <ac:spMkLst>
+            <pc:docMk/>
+            <pc:sldMk cId="525818786" sldId="257"/>
+            <ac:spMk id="12" creationId="{D314E29F-50AE-452A-91B9-E32C12D96608}"/>
+          </ac:spMkLst>
+        </pc:spChg>
+        <pc:spChg chg="add del mod">
+          <ac:chgData name="Davide Marcato" userId="e8fd52e3-1508-44a4-af20-03021de06d73" providerId="ADAL" clId="{DC4604E9-7B38-405A-BD50-36055A4D10DD}" dt="2018-08-22T12:34:18.144" v="4" actId="478"/>
+          <ac:spMkLst>
+            <pc:docMk/>
+            <pc:sldMk cId="525818786" sldId="257"/>
+            <ac:spMk id="13" creationId="{0681FB13-31B1-4A6B-B49B-D27EFEB91415}"/>
+          </ac:spMkLst>
+        </pc:spChg>
+        <pc:spChg chg="add del mod">
+          <ac:chgData name="Davide Marcato" userId="e8fd52e3-1508-44a4-af20-03021de06d73" providerId="ADAL" clId="{DC4604E9-7B38-405A-BD50-36055A4D10DD}" dt="2018-08-22T12:34:18.144" v="4" actId="478"/>
+          <ac:spMkLst>
+            <pc:docMk/>
+            <pc:sldMk cId="525818786" sldId="257"/>
+            <ac:spMk id="14" creationId="{5C6E5486-0140-4D0D-9446-1765DD18A53E}"/>
+          </ac:spMkLst>
+        </pc:spChg>
+        <pc:spChg chg="del mod">
+          <ac:chgData name="Davide Marcato" userId="e8fd52e3-1508-44a4-af20-03021de06d73" providerId="ADAL" clId="{DC4604E9-7B38-405A-BD50-36055A4D10DD}" dt="2018-08-22T12:33:54.881" v="1" actId="478"/>
+          <ac:spMkLst>
+            <pc:docMk/>
+            <pc:sldMk cId="525818786" sldId="257"/>
+            <ac:spMk id="67" creationId="{7609D74A-91FF-4929-954B-14BD4B32C6CB}"/>
+          </ac:spMkLst>
+        </pc:spChg>
+        <pc:spChg chg="del mod">
+          <ac:chgData name="Davide Marcato" userId="e8fd52e3-1508-44a4-af20-03021de06d73" providerId="ADAL" clId="{DC4604E9-7B38-405A-BD50-36055A4D10DD}" dt="2018-08-22T12:34:23.812" v="9" actId="478"/>
+          <ac:spMkLst>
+            <pc:docMk/>
+            <pc:sldMk cId="525818786" sldId="257"/>
+            <ac:spMk id="70" creationId="{8AF29C49-B438-477A-8FBE-351B3273BDFB}"/>
+          </ac:spMkLst>
+        </pc:spChg>
+        <pc:spChg chg="del">
+          <ac:chgData name="Davide Marcato" userId="e8fd52e3-1508-44a4-af20-03021de06d73" providerId="ADAL" clId="{DC4604E9-7B38-405A-BD50-36055A4D10DD}" dt="2018-08-22T12:34:18.144" v="4" actId="478"/>
+          <ac:spMkLst>
+            <pc:docMk/>
+            <pc:sldMk cId="525818786" sldId="257"/>
+            <ac:spMk id="71" creationId="{DED1CD80-E846-4660-A6C3-F0748B88B157}"/>
+          </ac:spMkLst>
+        </pc:spChg>
+        <pc:spChg chg="del">
+          <ac:chgData name="Davide Marcato" userId="e8fd52e3-1508-44a4-af20-03021de06d73" providerId="ADAL" clId="{DC4604E9-7B38-405A-BD50-36055A4D10DD}" dt="2018-08-22T12:34:00.940" v="2" actId="478"/>
+          <ac:spMkLst>
+            <pc:docMk/>
+            <pc:sldMk cId="525818786" sldId="257"/>
+            <ac:spMk id="72" creationId="{FC225E80-1FA0-4D62-9FAD-1FE5CC339ED7}"/>
+          </ac:spMkLst>
+        </pc:spChg>
+        <pc:spChg chg="del">
+          <ac:chgData name="Davide Marcato" userId="e8fd52e3-1508-44a4-af20-03021de06d73" providerId="ADAL" clId="{DC4604E9-7B38-405A-BD50-36055A4D10DD}" dt="2018-08-22T12:34:18.144" v="4" actId="478"/>
+          <ac:spMkLst>
+            <pc:docMk/>
+            <pc:sldMk cId="525818786" sldId="257"/>
+            <ac:spMk id="73" creationId="{D53E1263-BDA6-4236-BB74-52DBC2AF0178}"/>
+          </ac:spMkLst>
+        </pc:spChg>
+      </pc:sldChg>
+      <pc:sldChg chg="addSp delSp modSp add setBg">
+        <pc:chgData name="Davide Marcato" userId="e8fd52e3-1508-44a4-af20-03021de06d73" providerId="ADAL" clId="{DC4604E9-7B38-405A-BD50-36055A4D10DD}" dt="2018-08-22T12:54:33.966" v="236"/>
+        <pc:sldMkLst>
+          <pc:docMk/>
+          <pc:sldMk cId="1624972551" sldId="258"/>
+        </pc:sldMkLst>
+        <pc:spChg chg="del">
+          <ac:chgData name="Davide Marcato" userId="e8fd52e3-1508-44a4-af20-03021de06d73" providerId="ADAL" clId="{DC4604E9-7B38-405A-BD50-36055A4D10DD}" dt="2018-08-22T12:36:33.296" v="27" actId="478"/>
+          <ac:spMkLst>
+            <pc:docMk/>
+            <pc:sldMk cId="1624972551" sldId="258"/>
+            <ac:spMk id="2" creationId="{8DEEC25E-ABD5-4024-8014-38C59204A664}"/>
+          </ac:spMkLst>
+        </pc:spChg>
+        <pc:spChg chg="del">
+          <ac:chgData name="Davide Marcato" userId="e8fd52e3-1508-44a4-af20-03021de06d73" providerId="ADAL" clId="{DC4604E9-7B38-405A-BD50-36055A4D10DD}" dt="2018-08-22T12:36:30.665" v="26" actId="478"/>
+          <ac:spMkLst>
+            <pc:docMk/>
+            <pc:sldMk cId="1624972551" sldId="258"/>
+            <ac:spMk id="3" creationId="{5B0F534D-C23B-4829-8590-00BE7491AF4B}"/>
+          </ac:spMkLst>
+        </pc:spChg>
+        <pc:spChg chg="add mod">
+          <ac:chgData name="Davide Marcato" userId="e8fd52e3-1508-44a4-af20-03021de06d73" providerId="ADAL" clId="{DC4604E9-7B38-405A-BD50-36055A4D10DD}" dt="2018-08-22T12:51:30.027" v="223" actId="404"/>
+          <ac:spMkLst>
+            <pc:docMk/>
+            <pc:sldMk cId="1624972551" sldId="258"/>
+            <ac:spMk id="4" creationId="{363B435E-BB02-4532-96DE-D48580BE819A}"/>
+          </ac:spMkLst>
+        </pc:spChg>
+        <pc:spChg chg="add mod">
+          <ac:chgData name="Davide Marcato" userId="e8fd52e3-1508-44a4-af20-03021de06d73" providerId="ADAL" clId="{DC4604E9-7B38-405A-BD50-36055A4D10DD}" dt="2018-08-22T12:51:19.064" v="219" actId="20577"/>
+          <ac:spMkLst>
+            <pc:docMk/>
+            <pc:sldMk cId="1624972551" sldId="258"/>
+            <ac:spMk id="5" creationId="{DAFB679A-D3C7-49CE-BC3A-B0D248C5845D}"/>
+          </ac:spMkLst>
+        </pc:spChg>
+        <pc:spChg chg="add mod">
+          <ac:chgData name="Davide Marcato" userId="e8fd52e3-1508-44a4-af20-03021de06d73" providerId="ADAL" clId="{DC4604E9-7B38-405A-BD50-36055A4D10DD}" dt="2018-08-22T12:51:21.426" v="221" actId="20577"/>
+          <ac:spMkLst>
+            <pc:docMk/>
+            <pc:sldMk cId="1624972551" sldId="258"/>
+            <ac:spMk id="6" creationId="{7FCC7E6A-8EB9-4930-9828-E8516B11C609}"/>
+          </ac:spMkLst>
+        </pc:spChg>
+        <pc:spChg chg="add mod ord">
+          <ac:chgData name="Davide Marcato" userId="e8fd52e3-1508-44a4-af20-03021de06d73" providerId="ADAL" clId="{DC4604E9-7B38-405A-BD50-36055A4D10DD}" dt="2018-08-22T12:50:36.606" v="213" actId="1076"/>
+          <ac:spMkLst>
+            <pc:docMk/>
+            <pc:sldMk cId="1624972551" sldId="258"/>
+            <ac:spMk id="15" creationId="{BCF03458-D5AE-48DC-8ED8-A40452621319}"/>
+          </ac:spMkLst>
+        </pc:spChg>
+        <pc:spChg chg="add mod">
+          <ac:chgData name="Davide Marcato" userId="e8fd52e3-1508-44a4-af20-03021de06d73" providerId="ADAL" clId="{DC4604E9-7B38-405A-BD50-36055A4D10DD}" dt="2018-08-22T12:50:36.606" v="213" actId="1076"/>
+          <ac:spMkLst>
+            <pc:docMk/>
+            <pc:sldMk cId="1624972551" sldId="258"/>
+            <ac:spMk id="32" creationId="{0D64AC4A-55D0-4BCB-8EBA-15893C5227E5}"/>
+          </ac:spMkLst>
+        </pc:spChg>
+        <pc:spChg chg="add mod">
+          <ac:chgData name="Davide Marcato" userId="e8fd52e3-1508-44a4-af20-03021de06d73" providerId="ADAL" clId="{DC4604E9-7B38-405A-BD50-36055A4D10DD}" dt="2018-08-22T12:50:36.606" v="213" actId="1076"/>
+          <ac:spMkLst>
+            <pc:docMk/>
+            <pc:sldMk cId="1624972551" sldId="258"/>
+            <ac:spMk id="51" creationId="{BABE9ADE-DBFC-4CD8-9125-BD4F93B3FC73}"/>
+          </ac:spMkLst>
+        </pc:spChg>
+        <pc:spChg chg="add mod">
+          <ac:chgData name="Davide Marcato" userId="e8fd52e3-1508-44a4-af20-03021de06d73" providerId="ADAL" clId="{DC4604E9-7B38-405A-BD50-36055A4D10DD}" dt="2018-08-22T12:50:42.638" v="214" actId="14100"/>
+          <ac:spMkLst>
+            <pc:docMk/>
+            <pc:sldMk cId="1624972551" sldId="258"/>
+            <ac:spMk id="52" creationId="{94DD605E-8A98-46D2-B1ED-979057C6B058}"/>
+          </ac:spMkLst>
+        </pc:spChg>
+        <pc:spChg chg="add mod">
+          <ac:chgData name="Davide Marcato" userId="e8fd52e3-1508-44a4-af20-03021de06d73" providerId="ADAL" clId="{DC4604E9-7B38-405A-BD50-36055A4D10DD}" dt="2018-08-22T12:50:46.641" v="215" actId="14100"/>
+          <ac:spMkLst>
+            <pc:docMk/>
+            <pc:sldMk cId="1624972551" sldId="258"/>
+            <ac:spMk id="53" creationId="{FF3C360B-CE1D-47CE-AA93-25852622EBB6}"/>
+          </ac:spMkLst>
+        </pc:spChg>
+        <pc:cxnChg chg="add del mod">
+          <ac:chgData name="Davide Marcato" userId="e8fd52e3-1508-44a4-af20-03021de06d73" providerId="ADAL" clId="{DC4604E9-7B38-405A-BD50-36055A4D10DD}" dt="2018-08-22T12:40:44.574" v="36" actId="478"/>
+          <ac:cxnSpMkLst>
+            <pc:docMk/>
+            <pc:sldMk cId="1624972551" sldId="258"/>
+            <ac:cxnSpMk id="8" creationId="{B301B2D1-E0D3-4B34-B9A0-975BFEC9CEC4}"/>
+          </ac:cxnSpMkLst>
+        </pc:cxnChg>
+        <pc:cxnChg chg="add del mod">
+          <ac:chgData name="Davide Marcato" userId="e8fd52e3-1508-44a4-af20-03021de06d73" providerId="ADAL" clId="{DC4604E9-7B38-405A-BD50-36055A4D10DD}" dt="2018-08-22T12:40:47.298" v="37" actId="478"/>
+          <ac:cxnSpMkLst>
+            <pc:docMk/>
+            <pc:sldMk cId="1624972551" sldId="258"/>
+            <ac:cxnSpMk id="10" creationId="{3919476F-4E84-4197-99D9-ADD94AC88765}"/>
+          </ac:cxnSpMkLst>
+        </pc:cxnChg>
+        <pc:cxnChg chg="add mod">
+          <ac:chgData name="Davide Marcato" userId="e8fd52e3-1508-44a4-af20-03021de06d73" providerId="ADAL" clId="{DC4604E9-7B38-405A-BD50-36055A4D10DD}" dt="2018-08-22T12:50:36.606" v="213" actId="1076"/>
+          <ac:cxnSpMkLst>
+            <pc:docMk/>
+            <pc:sldMk cId="1624972551" sldId="258"/>
+            <ac:cxnSpMk id="12" creationId="{309BB470-7604-484C-BE5D-2119DEF304AE}"/>
+          </ac:cxnSpMkLst>
+        </pc:cxnChg>
+        <pc:cxnChg chg="add mod">
+          <ac:chgData name="Davide Marcato" userId="e8fd52e3-1508-44a4-af20-03021de06d73" providerId="ADAL" clId="{DC4604E9-7B38-405A-BD50-36055A4D10DD}" dt="2018-08-22T12:50:36.606" v="213" actId="1076"/>
+          <ac:cxnSpMkLst>
+            <pc:docMk/>
+            <pc:sldMk cId="1624972551" sldId="258"/>
+            <ac:cxnSpMk id="14" creationId="{426A4CC2-4B6E-4764-8CE1-641A8BA35523}"/>
+          </ac:cxnSpMkLst>
+        </pc:cxnChg>
+        <pc:cxnChg chg="add mod">
+          <ac:chgData name="Davide Marcato" userId="e8fd52e3-1508-44a4-af20-03021de06d73" providerId="ADAL" clId="{DC4604E9-7B38-405A-BD50-36055A4D10DD}" dt="2018-08-22T12:50:36.606" v="213" actId="1076"/>
+          <ac:cxnSpMkLst>
+            <pc:docMk/>
+            <pc:sldMk cId="1624972551" sldId="258"/>
+            <ac:cxnSpMk id="28" creationId="{BC72C0E8-66AE-4E2D-9F67-3344895821E5}"/>
+          </ac:cxnSpMkLst>
+        </pc:cxnChg>
+        <pc:cxnChg chg="add mod">
+          <ac:chgData name="Davide Marcato" userId="e8fd52e3-1508-44a4-af20-03021de06d73" providerId="ADAL" clId="{DC4604E9-7B38-405A-BD50-36055A4D10DD}" dt="2018-08-22T12:50:36.606" v="213" actId="1076"/>
+          <ac:cxnSpMkLst>
+            <pc:docMk/>
+            <pc:sldMk cId="1624972551" sldId="258"/>
+            <ac:cxnSpMk id="30" creationId="{DE38225D-22CD-463A-B01A-63AA80D69B6D}"/>
+          </ac:cxnSpMkLst>
+        </pc:cxnChg>
+        <pc:cxnChg chg="add del mod">
+          <ac:chgData name="Davide Marcato" userId="e8fd52e3-1508-44a4-af20-03021de06d73" providerId="ADAL" clId="{DC4604E9-7B38-405A-BD50-36055A4D10DD}" dt="2018-08-22T12:46:34.193" v="132" actId="478"/>
+          <ac:cxnSpMkLst>
+            <pc:docMk/>
+            <pc:sldMk cId="1624972551" sldId="258"/>
+            <ac:cxnSpMk id="34" creationId="{00B037DC-EBEF-4355-B2ED-76F971FB6B50}"/>
+          </ac:cxnSpMkLst>
+        </pc:cxnChg>
+      </pc:sldChg>
+      <pc:sldMasterChg chg="setBg modSldLayout">
+        <pc:chgData name="Davide Marcato" userId="e8fd52e3-1508-44a4-af20-03021de06d73" providerId="ADAL" clId="{DC4604E9-7B38-405A-BD50-36055A4D10DD}" dt="2018-08-22T12:57:56.643" v="250"/>
+        <pc:sldMasterMkLst>
+          <pc:docMk/>
+          <pc:sldMasterMk cId="2472723675" sldId="2147483648"/>
+        </pc:sldMasterMkLst>
+        <pc:sldLayoutChg chg="setBg">
+          <pc:chgData name="Davide Marcato" userId="e8fd52e3-1508-44a4-af20-03021de06d73" providerId="ADAL" clId="{DC4604E9-7B38-405A-BD50-36055A4D10DD}" dt="2018-08-22T12:57:56.643" v="250"/>
+          <pc:sldLayoutMkLst>
+            <pc:docMk/>
+            <pc:sldMasterMk cId="2472723675" sldId="2147483648"/>
+            <pc:sldLayoutMk cId="3615713670" sldId="2147483649"/>
+          </pc:sldLayoutMkLst>
+        </pc:sldLayoutChg>
+        <pc:sldLayoutChg chg="setBg">
+          <pc:chgData name="Davide Marcato" userId="e8fd52e3-1508-44a4-af20-03021de06d73" providerId="ADAL" clId="{DC4604E9-7B38-405A-BD50-36055A4D10DD}" dt="2018-08-22T12:57:56.643" v="250"/>
+          <pc:sldLayoutMkLst>
+            <pc:docMk/>
+            <pc:sldMasterMk cId="2472723675" sldId="2147483648"/>
+            <pc:sldLayoutMk cId="3876120546" sldId="2147483650"/>
+          </pc:sldLayoutMkLst>
+        </pc:sldLayoutChg>
+        <pc:sldLayoutChg chg="setBg">
+          <pc:chgData name="Davide Marcato" userId="e8fd52e3-1508-44a4-af20-03021de06d73" providerId="ADAL" clId="{DC4604E9-7B38-405A-BD50-36055A4D10DD}" dt="2018-08-22T12:57:56.643" v="250"/>
+          <pc:sldLayoutMkLst>
+            <pc:docMk/>
+            <pc:sldMasterMk cId="2472723675" sldId="2147483648"/>
+            <pc:sldLayoutMk cId="3760760922" sldId="2147483651"/>
+          </pc:sldLayoutMkLst>
+        </pc:sldLayoutChg>
+        <pc:sldLayoutChg chg="setBg">
+          <pc:chgData name="Davide Marcato" userId="e8fd52e3-1508-44a4-af20-03021de06d73" providerId="ADAL" clId="{DC4604E9-7B38-405A-BD50-36055A4D10DD}" dt="2018-08-22T12:57:56.643" v="250"/>
+          <pc:sldLayoutMkLst>
+            <pc:docMk/>
+            <pc:sldMasterMk cId="2472723675" sldId="2147483648"/>
+            <pc:sldLayoutMk cId="840690951" sldId="2147483652"/>
+          </pc:sldLayoutMkLst>
+        </pc:sldLayoutChg>
+        <pc:sldLayoutChg chg="setBg">
+          <pc:chgData name="Davide Marcato" userId="e8fd52e3-1508-44a4-af20-03021de06d73" providerId="ADAL" clId="{DC4604E9-7B38-405A-BD50-36055A4D10DD}" dt="2018-08-22T12:57:56.643" v="250"/>
+          <pc:sldLayoutMkLst>
+            <pc:docMk/>
+            <pc:sldMasterMk cId="2472723675" sldId="2147483648"/>
+            <pc:sldLayoutMk cId="1267557784" sldId="2147483653"/>
+          </pc:sldLayoutMkLst>
+        </pc:sldLayoutChg>
+        <pc:sldLayoutChg chg="setBg">
+          <pc:chgData name="Davide Marcato" userId="e8fd52e3-1508-44a4-af20-03021de06d73" providerId="ADAL" clId="{DC4604E9-7B38-405A-BD50-36055A4D10DD}" dt="2018-08-22T12:57:56.643" v="250"/>
+          <pc:sldLayoutMkLst>
+            <pc:docMk/>
+            <pc:sldMasterMk cId="2472723675" sldId="2147483648"/>
+            <pc:sldLayoutMk cId="908902855" sldId="2147483654"/>
+          </pc:sldLayoutMkLst>
+        </pc:sldLayoutChg>
+        <pc:sldLayoutChg chg="setBg">
+          <pc:chgData name="Davide Marcato" userId="e8fd52e3-1508-44a4-af20-03021de06d73" providerId="ADAL" clId="{DC4604E9-7B38-405A-BD50-36055A4D10DD}" dt="2018-08-22T12:57:56.643" v="250"/>
+          <pc:sldLayoutMkLst>
+            <pc:docMk/>
+            <pc:sldMasterMk cId="2472723675" sldId="2147483648"/>
+            <pc:sldLayoutMk cId="3208012574" sldId="2147483655"/>
+          </pc:sldLayoutMkLst>
+        </pc:sldLayoutChg>
+        <pc:sldLayoutChg chg="setBg">
+          <pc:chgData name="Davide Marcato" userId="e8fd52e3-1508-44a4-af20-03021de06d73" providerId="ADAL" clId="{DC4604E9-7B38-405A-BD50-36055A4D10DD}" dt="2018-08-22T12:57:56.643" v="250"/>
+          <pc:sldLayoutMkLst>
+            <pc:docMk/>
+            <pc:sldMasterMk cId="2472723675" sldId="2147483648"/>
+            <pc:sldLayoutMk cId="4211620240" sldId="2147483656"/>
+          </pc:sldLayoutMkLst>
+        </pc:sldLayoutChg>
+        <pc:sldLayoutChg chg="setBg">
+          <pc:chgData name="Davide Marcato" userId="e8fd52e3-1508-44a4-af20-03021de06d73" providerId="ADAL" clId="{DC4604E9-7B38-405A-BD50-36055A4D10DD}" dt="2018-08-22T12:57:56.643" v="250"/>
+          <pc:sldLayoutMkLst>
+            <pc:docMk/>
+            <pc:sldMasterMk cId="2472723675" sldId="2147483648"/>
+            <pc:sldLayoutMk cId="1300693740" sldId="2147483657"/>
+          </pc:sldLayoutMkLst>
+        </pc:sldLayoutChg>
+        <pc:sldLayoutChg chg="setBg">
+          <pc:chgData name="Davide Marcato" userId="e8fd52e3-1508-44a4-af20-03021de06d73" providerId="ADAL" clId="{DC4604E9-7B38-405A-BD50-36055A4D10DD}" dt="2018-08-22T12:57:56.643" v="250"/>
+          <pc:sldLayoutMkLst>
+            <pc:docMk/>
+            <pc:sldMasterMk cId="2472723675" sldId="2147483648"/>
+            <pc:sldLayoutMk cId="160872114" sldId="2147483658"/>
+          </pc:sldLayoutMkLst>
+        </pc:sldLayoutChg>
+        <pc:sldLayoutChg chg="setBg">
+          <pc:chgData name="Davide Marcato" userId="e8fd52e3-1508-44a4-af20-03021de06d73" providerId="ADAL" clId="{DC4604E9-7B38-405A-BD50-36055A4D10DD}" dt="2018-08-22T12:57:56.643" v="250"/>
+          <pc:sldLayoutMkLst>
+            <pc:docMk/>
+            <pc:sldMasterMk cId="2472723675" sldId="2147483648"/>
+            <pc:sldLayoutMk cId="1731752352" sldId="2147483659"/>
+          </pc:sldLayoutMkLst>
+        </pc:sldLayoutChg>
+      </pc:sldMasterChg>
+    </pc:docChg>
+  </pc:docChgLst>
+  <pc:docChgLst>
+    <pc:chgData name="Davide Marcato" userId="S::marcato@infn.it::e8fd52e3-1508-44a4-af20-03021de06d73" providerId="AD" clId="Web-{E31AEE8D-35AC-4153-85BD-EB6D86F005F2}"/>
+    <pc:docChg chg="addSld delSld modSld">
+      <pc:chgData name="Davide Marcato" userId="S::marcato@infn.it::e8fd52e3-1508-44a4-af20-03021de06d73" providerId="AD" clId="Web-{E31AEE8D-35AC-4153-85BD-EB6D86F005F2}" dt="2018-08-20T14:22:23.868" v="32" actId="1076"/>
+      <pc:docMkLst>
+        <pc:docMk/>
+      </pc:docMkLst>
+      <pc:sldChg chg="addSp delSp modSp add replId">
+        <pc:chgData name="Davide Marcato" userId="S::marcato@infn.it::e8fd52e3-1508-44a4-af20-03021de06d73" providerId="AD" clId="Web-{E31AEE8D-35AC-4153-85BD-EB6D86F005F2}" dt="2018-08-20T14:22:23.868" v="32" actId="1076"/>
+        <pc:sldMkLst>
+          <pc:docMk/>
+          <pc:sldMk cId="525818786" sldId="257"/>
+        </pc:sldMkLst>
+        <pc:spChg chg="add del">
+          <ac:chgData name="Davide Marcato" userId="S::marcato@infn.it::e8fd52e3-1508-44a4-af20-03021de06d73" providerId="AD" clId="Web-{E31AEE8D-35AC-4153-85BD-EB6D86F005F2}" dt="2018-08-20T14:21:13.413" v="17"/>
+          <ac:spMkLst>
+            <pc:docMk/>
+            <pc:sldMk cId="525818786" sldId="257"/>
+            <ac:spMk id="6" creationId="{711A0733-1305-48BA-AE59-23D0E41CFA76}"/>
+          </ac:spMkLst>
+        </pc:spChg>
+        <pc:spChg chg="mod">
+          <ac:chgData name="Davide Marcato" userId="S::marcato@infn.it::e8fd52e3-1508-44a4-af20-03021de06d73" providerId="AD" clId="Web-{E31AEE8D-35AC-4153-85BD-EB6D86F005F2}" dt="2018-08-20T14:22:21.946" v="31" actId="1076"/>
+          <ac:spMkLst>
+            <pc:docMk/>
+            <pc:sldMk cId="525818786" sldId="257"/>
+            <ac:spMk id="7" creationId="{05C12E3F-851A-4EEC-9B22-996C306E570E}"/>
+          </ac:spMkLst>
+        </pc:spChg>
+        <pc:spChg chg="mod">
+          <ac:chgData name="Davide Marcato" userId="S::marcato@infn.it::e8fd52e3-1508-44a4-af20-03021de06d73" providerId="AD" clId="Web-{E31AEE8D-35AC-4153-85BD-EB6D86F005F2}" dt="2018-08-20T14:22:23.868" v="32" actId="1076"/>
+          <ac:spMkLst>
+            <pc:docMk/>
+            <pc:sldMk cId="525818786" sldId="257"/>
+            <ac:spMk id="8" creationId="{BF36A2FE-6FEA-4A83-82A1-23334F10D52D}"/>
+          </ac:spMkLst>
+        </pc:spChg>
+        <pc:spChg chg="mod">
+          <ac:chgData name="Davide Marcato" userId="S::marcato@infn.it::e8fd52e3-1508-44a4-af20-03021de06d73" providerId="AD" clId="Web-{E31AEE8D-35AC-4153-85BD-EB6D86F005F2}" dt="2018-08-20T14:22:11.086" v="29" actId="14100"/>
+          <ac:spMkLst>
+            <pc:docMk/>
+            <pc:sldMk cId="525818786" sldId="257"/>
+            <ac:spMk id="9" creationId="{AF3125F1-74F0-4380-A2C1-5C5FA6EB9C42}"/>
+          </ac:spMkLst>
+        </pc:spChg>
+        <pc:spChg chg="mod">
+          <ac:chgData name="Davide Marcato" userId="S::marcato@infn.it::e8fd52e3-1508-44a4-af20-03021de06d73" providerId="AD" clId="Web-{E31AEE8D-35AC-4153-85BD-EB6D86F005F2}" dt="2018-08-20T14:22:07.836" v="28" actId="14100"/>
+          <ac:spMkLst>
+            <pc:docMk/>
+            <pc:sldMk cId="525818786" sldId="257"/>
+            <ac:spMk id="10" creationId="{68E774B8-4E07-42CD-8168-223AD351828A}"/>
+          </ac:spMkLst>
+        </pc:spChg>
+        <pc:spChg chg="mod">
+          <ac:chgData name="Davide Marcato" userId="S::marcato@infn.it::e8fd52e3-1508-44a4-af20-03021de06d73" providerId="AD" clId="Web-{E31AEE8D-35AC-4153-85BD-EB6D86F005F2}" dt="2018-08-20T14:21:55.195" v="26" actId="1076"/>
+          <ac:spMkLst>
+            <pc:docMk/>
+            <pc:sldMk cId="525818786" sldId="257"/>
+            <ac:spMk id="67" creationId="{7609D74A-91FF-4929-954B-14BD4B32C6CB}"/>
+          </ac:spMkLst>
+        </pc:spChg>
+      </pc:sldChg>
+    </pc:docChg>
+  </pc:docChgLst>
+</pc:chgInfo>
 </file>
 
 <file path=ppt/slideLayouts/slideLayout1.xml><?xml version="1.0" encoding="utf-8"?>
@@ -254,7 +696,7 @@
           <a:p>
             <a:fld id="{FAACF760-3FDE-46FE-9CC1-808570D0336C}" type="datetimeFigureOut">
               <a:rPr lang="it-IT" smtClean="0"/>
-              <a:t>27/03/2018</a:t>
+              <a:t>22/08/2018</a:t>
             </a:fld>
             <a:endParaRPr lang="it-IT"/>
           </a:p>
@@ -452,7 +894,7 @@
           <a:p>
             <a:fld id="{FAACF760-3FDE-46FE-9CC1-808570D0336C}" type="datetimeFigureOut">
               <a:rPr lang="it-IT" smtClean="0"/>
-              <a:t>27/03/2018</a:t>
+              <a:t>22/08/2018</a:t>
             </a:fld>
             <a:endParaRPr lang="it-IT"/>
           </a:p>
@@ -660,7 +1102,7 @@
           <a:p>
             <a:fld id="{FAACF760-3FDE-46FE-9CC1-808570D0336C}" type="datetimeFigureOut">
               <a:rPr lang="it-IT" smtClean="0"/>
-              <a:t>27/03/2018</a:t>
+              <a:t>22/08/2018</a:t>
             </a:fld>
             <a:endParaRPr lang="it-IT"/>
           </a:p>
@@ -858,7 +1300,7 @@
           <a:p>
             <a:fld id="{FAACF760-3FDE-46FE-9CC1-808570D0336C}" type="datetimeFigureOut">
               <a:rPr lang="it-IT" smtClean="0"/>
-              <a:t>27/03/2018</a:t>
+              <a:t>22/08/2018</a:t>
             </a:fld>
             <a:endParaRPr lang="it-IT"/>
           </a:p>
@@ -1133,7 +1575,7 @@
           <a:p>
             <a:fld id="{FAACF760-3FDE-46FE-9CC1-808570D0336C}" type="datetimeFigureOut">
               <a:rPr lang="it-IT" smtClean="0"/>
-              <a:t>27/03/2018</a:t>
+              <a:t>22/08/2018</a:t>
             </a:fld>
             <a:endParaRPr lang="it-IT"/>
           </a:p>
@@ -1398,7 +1840,7 @@
           <a:p>
             <a:fld id="{FAACF760-3FDE-46FE-9CC1-808570D0336C}" type="datetimeFigureOut">
               <a:rPr lang="it-IT" smtClean="0"/>
-              <a:t>27/03/2018</a:t>
+              <a:t>22/08/2018</a:t>
             </a:fld>
             <a:endParaRPr lang="it-IT"/>
           </a:p>
@@ -1810,7 +2252,7 @@
           <a:p>
             <a:fld id="{FAACF760-3FDE-46FE-9CC1-808570D0336C}" type="datetimeFigureOut">
               <a:rPr lang="it-IT" smtClean="0"/>
-              <a:t>27/03/2018</a:t>
+              <a:t>22/08/2018</a:t>
             </a:fld>
             <a:endParaRPr lang="it-IT"/>
           </a:p>
@@ -1951,7 +2393,7 @@
           <a:p>
             <a:fld id="{FAACF760-3FDE-46FE-9CC1-808570D0336C}" type="datetimeFigureOut">
               <a:rPr lang="it-IT" smtClean="0"/>
-              <a:t>27/03/2018</a:t>
+              <a:t>22/08/2018</a:t>
             </a:fld>
             <a:endParaRPr lang="it-IT"/>
           </a:p>
@@ -2064,7 +2506,7 @@
           <a:p>
             <a:fld id="{FAACF760-3FDE-46FE-9CC1-808570D0336C}" type="datetimeFigureOut">
               <a:rPr lang="it-IT" smtClean="0"/>
-              <a:t>27/03/2018</a:t>
+              <a:t>22/08/2018</a:t>
             </a:fld>
             <a:endParaRPr lang="it-IT"/>
           </a:p>
@@ -2375,7 +2817,7 @@
           <a:p>
             <a:fld id="{FAACF760-3FDE-46FE-9CC1-808570D0336C}" type="datetimeFigureOut">
               <a:rPr lang="it-IT" smtClean="0"/>
-              <a:t>27/03/2018</a:t>
+              <a:t>22/08/2018</a:t>
             </a:fld>
             <a:endParaRPr lang="it-IT"/>
           </a:p>
@@ -2663,7 +3105,7 @@
           <a:p>
             <a:fld id="{FAACF760-3FDE-46FE-9CC1-808570D0336C}" type="datetimeFigureOut">
               <a:rPr lang="it-IT" smtClean="0"/>
-              <a:t>27/03/2018</a:t>
+              <a:t>22/08/2018</a:t>
             </a:fld>
             <a:endParaRPr lang="it-IT"/>
           </a:p>
@@ -2740,9 +3182,12 @@
 <p:sldMaster xmlns:a="http://schemas.openxmlformats.org/drawingml/2006/main" xmlns:r="http://schemas.openxmlformats.org/officeDocument/2006/relationships" xmlns:p="http://schemas.openxmlformats.org/presentationml/2006/main">
   <p:cSld>
     <p:bg>
-      <p:bgRef idx="1001">
-        <a:schemeClr val="bg1"/>
-      </p:bgRef>
+      <p:bgPr>
+        <a:solidFill>
+          <a:schemeClr val="bg1"/>
+        </a:solidFill>
+        <a:effectLst/>
+      </p:bgPr>
     </p:bg>
     <p:spTree>
       <p:nvGrpSpPr>
@@ -2904,7 +3349,7 @@
           <a:p>
             <a:fld id="{FAACF760-3FDE-46FE-9CC1-808570D0336C}" type="datetimeFigureOut">
               <a:rPr lang="it-IT" smtClean="0"/>
-              <a:t>27/03/2018</a:t>
+              <a:t>22/08/2018</a:t>
             </a:fld>
             <a:endParaRPr lang="it-IT"/>
           </a:p>
@@ -3866,6 +4311,776 @@
 </p:sld>
 </file>
 
+<file path=ppt/slides/slide2.xml><?xml version="1.0" encoding="utf-8"?>
+<p:sld xmlns:a="http://schemas.openxmlformats.org/drawingml/2006/main" xmlns:r="http://schemas.openxmlformats.org/officeDocument/2006/relationships" xmlns:p="http://schemas.openxmlformats.org/presentationml/2006/main">
+  <p:cSld>
+    <p:spTree>
+      <p:nvGrpSpPr>
+        <p:cNvPr id="1" name=""/>
+        <p:cNvGrpSpPr/>
+        <p:nvPr/>
+      </p:nvGrpSpPr>
+      <p:grpSpPr>
+        <a:xfrm>
+          <a:off x="0" y="0"/>
+          <a:ext cx="0" cy="0"/>
+          <a:chOff x="0" y="0"/>
+          <a:chExt cx="0" cy="0"/>
+        </a:xfrm>
+      </p:grpSpPr>
+      <p:sp>
+        <p:nvSpPr>
+          <p:cNvPr id="8" name="Rettangolo 7">
+            <a:extLst>
+              <a:ext uri="{FF2B5EF4-FFF2-40B4-BE49-F238E27FC236}">
+                <a16:creationId xmlns:a16="http://schemas.microsoft.com/office/drawing/2014/main" id="{BF36A2FE-6FEA-4A83-82A1-23334F10D52D}"/>
+              </a:ext>
+            </a:extLst>
+          </p:cNvPr>
+          <p:cNvSpPr/>
+          <p:nvPr/>
+        </p:nvSpPr>
+        <p:spPr>
+          <a:xfrm>
+            <a:off x="4994650" y="2316586"/>
+            <a:ext cx="1800000" cy="1800000"/>
+          </a:xfrm>
+          <a:prstGeom prst="rect">
+            <a:avLst/>
+          </a:prstGeom>
+          <a:solidFill>
+            <a:srgbClr val="00FF00"/>
+          </a:solidFill>
+          <a:ln w="88900">
+            <a:solidFill>
+              <a:schemeClr val="tx1"/>
+            </a:solidFill>
+          </a:ln>
+        </p:spPr>
+        <p:style>
+          <a:lnRef idx="2">
+            <a:schemeClr val="accent1">
+              <a:shade val="50000"/>
+            </a:schemeClr>
+          </a:lnRef>
+          <a:fillRef idx="1">
+            <a:schemeClr val="accent1"/>
+          </a:fillRef>
+          <a:effectRef idx="0">
+            <a:schemeClr val="accent1"/>
+          </a:effectRef>
+          <a:fontRef idx="minor">
+            <a:schemeClr val="lt1"/>
+          </a:fontRef>
+        </p:style>
+        <p:txBody>
+          <a:bodyPr rtlCol="0" anchor="ctr"/>
+          <a:lstStyle/>
+          <a:p>
+            <a:pPr algn="ctr"/>
+            <a:endParaRPr lang="it-IT"/>
+          </a:p>
+        </p:txBody>
+      </p:sp>
+      <p:sp>
+        <p:nvSpPr>
+          <p:cNvPr id="11" name="Rettangolo 10">
+            <a:extLst>
+              <a:ext uri="{FF2B5EF4-FFF2-40B4-BE49-F238E27FC236}">
+                <a16:creationId xmlns:a16="http://schemas.microsoft.com/office/drawing/2014/main" id="{1B9351D4-601B-4FEA-A785-9CCD38C8C6F2}"/>
+              </a:ext>
+            </a:extLst>
+          </p:cNvPr>
+          <p:cNvSpPr/>
+          <p:nvPr/>
+        </p:nvSpPr>
+        <p:spPr>
+          <a:xfrm>
+            <a:off x="5655224" y="2022764"/>
+            <a:ext cx="1440000" cy="1440000"/>
+          </a:xfrm>
+          <a:prstGeom prst="rect">
+            <a:avLst/>
+          </a:prstGeom>
+          <a:solidFill>
+            <a:srgbClr val="FFFF00"/>
+          </a:solidFill>
+          <a:ln w="63500">
+            <a:solidFill>
+              <a:schemeClr val="tx1"/>
+            </a:solidFill>
+          </a:ln>
+        </p:spPr>
+        <p:style>
+          <a:lnRef idx="2">
+            <a:schemeClr val="accent1">
+              <a:shade val="50000"/>
+            </a:schemeClr>
+          </a:lnRef>
+          <a:fillRef idx="1">
+            <a:schemeClr val="accent1"/>
+          </a:fillRef>
+          <a:effectRef idx="0">
+            <a:schemeClr val="accent1"/>
+          </a:effectRef>
+          <a:fontRef idx="minor">
+            <a:schemeClr val="lt1"/>
+          </a:fontRef>
+        </p:style>
+        <p:txBody>
+          <a:bodyPr rtlCol="0" anchor="ctr"/>
+          <a:lstStyle/>
+          <a:p>
+            <a:pPr algn="ctr"/>
+            <a:endParaRPr lang="it-IT"/>
+          </a:p>
+        </p:txBody>
+      </p:sp>
+    </p:spTree>
+    <p:extLst>
+      <p:ext uri="{BB962C8B-B14F-4D97-AF65-F5344CB8AC3E}">
+        <p14:creationId xmlns:p14="http://schemas.microsoft.com/office/powerpoint/2010/main" val="525818786"/>
+      </p:ext>
+    </p:extLst>
+  </p:cSld>
+  <p:clrMapOvr>
+    <a:masterClrMapping/>
+  </p:clrMapOvr>
+</p:sld>
+</file>
+
+<file path=ppt/slides/slide3.xml><?xml version="1.0" encoding="utf-8"?>
+<p:sld xmlns:a="http://schemas.openxmlformats.org/drawingml/2006/main" xmlns:r="http://schemas.openxmlformats.org/officeDocument/2006/relationships" xmlns:p="http://schemas.openxmlformats.org/presentationml/2006/main">
+  <p:cSld>
+    <p:spTree>
+      <p:nvGrpSpPr>
+        <p:cNvPr id="1" name=""/>
+        <p:cNvGrpSpPr/>
+        <p:nvPr/>
+      </p:nvGrpSpPr>
+      <p:grpSpPr>
+        <a:xfrm>
+          <a:off x="0" y="0"/>
+          <a:ext cx="0" cy="0"/>
+          <a:chOff x="0" y="0"/>
+          <a:chExt cx="0" cy="0"/>
+        </a:xfrm>
+      </p:grpSpPr>
+      <p:sp>
+        <p:nvSpPr>
+          <p:cNvPr id="15" name="Ovale 14">
+            <a:extLst>
+              <a:ext uri="{FF2B5EF4-FFF2-40B4-BE49-F238E27FC236}">
+                <a16:creationId xmlns:a16="http://schemas.microsoft.com/office/drawing/2014/main" id="{BCF03458-D5AE-48DC-8ED8-A40452621319}"/>
+              </a:ext>
+            </a:extLst>
+          </p:cNvPr>
+          <p:cNvSpPr/>
+          <p:nvPr/>
+        </p:nvSpPr>
+        <p:spPr>
+          <a:xfrm>
+            <a:off x="2436872" y="879230"/>
+            <a:ext cx="7540284" cy="5099539"/>
+          </a:xfrm>
+          <a:prstGeom prst="ellipse">
+            <a:avLst/>
+          </a:prstGeom>
+          <a:solidFill>
+            <a:schemeClr val="accent4">
+              <a:lumMod val="60000"/>
+              <a:lumOff val="40000"/>
+            </a:schemeClr>
+          </a:solidFill>
+          <a:ln>
+            <a:solidFill>
+              <a:schemeClr val="tx1"/>
+            </a:solidFill>
+          </a:ln>
+        </p:spPr>
+        <p:style>
+          <a:lnRef idx="2">
+            <a:schemeClr val="accent1">
+              <a:shade val="50000"/>
+            </a:schemeClr>
+          </a:lnRef>
+          <a:fillRef idx="1">
+            <a:schemeClr val="accent1"/>
+          </a:fillRef>
+          <a:effectRef idx="0">
+            <a:schemeClr val="accent1"/>
+          </a:effectRef>
+          <a:fontRef idx="minor">
+            <a:schemeClr val="lt1"/>
+          </a:fontRef>
+        </p:style>
+        <p:txBody>
+          <a:bodyPr rtlCol="0" anchor="ctr"/>
+          <a:lstStyle/>
+          <a:p>
+            <a:pPr algn="ctr"/>
+            <a:endParaRPr lang="it-IT"/>
+          </a:p>
+        </p:txBody>
+      </p:sp>
+      <p:sp>
+        <p:nvSpPr>
+          <p:cNvPr id="4" name="Ovale 3">
+            <a:extLst>
+              <a:ext uri="{FF2B5EF4-FFF2-40B4-BE49-F238E27FC236}">
+                <a16:creationId xmlns:a16="http://schemas.microsoft.com/office/drawing/2014/main" id="{363B435E-BB02-4532-96DE-D48580BE819A}"/>
+              </a:ext>
+            </a:extLst>
+          </p:cNvPr>
+          <p:cNvSpPr/>
+          <p:nvPr/>
+        </p:nvSpPr>
+        <p:spPr>
+          <a:xfrm>
+            <a:off x="2880005" y="2723067"/>
+            <a:ext cx="1440000" cy="1440000"/>
+          </a:xfrm>
+          <a:prstGeom prst="ellipse">
+            <a:avLst/>
+          </a:prstGeom>
+          <a:solidFill>
+            <a:srgbClr val="00B050"/>
+          </a:solidFill>
+          <a:ln>
+            <a:solidFill>
+              <a:schemeClr val="tx1"/>
+            </a:solidFill>
+          </a:ln>
+        </p:spPr>
+        <p:style>
+          <a:lnRef idx="2">
+            <a:schemeClr val="accent1">
+              <a:shade val="50000"/>
+            </a:schemeClr>
+          </a:lnRef>
+          <a:fillRef idx="1">
+            <a:schemeClr val="accent1"/>
+          </a:fillRef>
+          <a:effectRef idx="0">
+            <a:schemeClr val="accent1"/>
+          </a:effectRef>
+          <a:fontRef idx="minor">
+            <a:schemeClr val="lt1"/>
+          </a:fontRef>
+        </p:style>
+        <p:txBody>
+          <a:bodyPr rtlCol="0" anchor="ctr"/>
+          <a:lstStyle/>
+          <a:p>
+            <a:pPr algn="ctr"/>
+            <a:r>
+              <a:rPr lang="it-IT" sz="2800" dirty="0"/>
+              <a:t>entry</a:t>
+            </a:r>
+          </a:p>
+        </p:txBody>
+      </p:sp>
+      <p:sp>
+        <p:nvSpPr>
+          <p:cNvPr id="5" name="Ovale 4">
+            <a:extLst>
+              <a:ext uri="{FF2B5EF4-FFF2-40B4-BE49-F238E27FC236}">
+                <a16:creationId xmlns:a16="http://schemas.microsoft.com/office/drawing/2014/main" id="{DAFB679A-D3C7-49CE-BC3A-B0D248C5845D}"/>
+              </a:ext>
+            </a:extLst>
+          </p:cNvPr>
+          <p:cNvSpPr/>
+          <p:nvPr/>
+        </p:nvSpPr>
+        <p:spPr>
+          <a:xfrm>
+            <a:off x="5122527" y="2363067"/>
+            <a:ext cx="2160000" cy="2160000"/>
+          </a:xfrm>
+          <a:prstGeom prst="ellipse">
+            <a:avLst/>
+          </a:prstGeom>
+          <a:ln>
+            <a:solidFill>
+              <a:schemeClr val="tx1"/>
+            </a:solidFill>
+          </a:ln>
+        </p:spPr>
+        <p:style>
+          <a:lnRef idx="2">
+            <a:schemeClr val="accent1">
+              <a:shade val="50000"/>
+            </a:schemeClr>
+          </a:lnRef>
+          <a:fillRef idx="1">
+            <a:schemeClr val="accent1"/>
+          </a:fillRef>
+          <a:effectRef idx="0">
+            <a:schemeClr val="accent1"/>
+          </a:effectRef>
+          <a:fontRef idx="minor">
+            <a:schemeClr val="lt1"/>
+          </a:fontRef>
+        </p:style>
+        <p:txBody>
+          <a:bodyPr rtlCol="0" anchor="ctr"/>
+          <a:lstStyle/>
+          <a:p>
+            <a:pPr algn="ctr"/>
+            <a:r>
+              <a:rPr lang="it-IT" sz="2800" dirty="0" err="1"/>
+              <a:t>eval</a:t>
+            </a:r>
+            <a:endParaRPr lang="it-IT" sz="3200" dirty="0"/>
+          </a:p>
+        </p:txBody>
+      </p:sp>
+      <p:sp>
+        <p:nvSpPr>
+          <p:cNvPr id="6" name="Ovale 5">
+            <a:extLst>
+              <a:ext uri="{FF2B5EF4-FFF2-40B4-BE49-F238E27FC236}">
+                <a16:creationId xmlns:a16="http://schemas.microsoft.com/office/drawing/2014/main" id="{7FCC7E6A-8EB9-4930-9828-E8516B11C609}"/>
+              </a:ext>
+            </a:extLst>
+          </p:cNvPr>
+          <p:cNvSpPr/>
+          <p:nvPr/>
+        </p:nvSpPr>
+        <p:spPr>
+          <a:xfrm>
+            <a:off x="8122565" y="2723067"/>
+            <a:ext cx="1440000" cy="1440000"/>
+          </a:xfrm>
+          <a:prstGeom prst="ellipse">
+            <a:avLst/>
+          </a:prstGeom>
+          <a:solidFill>
+            <a:srgbClr val="00B050"/>
+          </a:solidFill>
+          <a:ln>
+            <a:solidFill>
+              <a:schemeClr val="tx1"/>
+            </a:solidFill>
+          </a:ln>
+        </p:spPr>
+        <p:style>
+          <a:lnRef idx="2">
+            <a:schemeClr val="accent1">
+              <a:shade val="50000"/>
+            </a:schemeClr>
+          </a:lnRef>
+          <a:fillRef idx="1">
+            <a:schemeClr val="accent1"/>
+          </a:fillRef>
+          <a:effectRef idx="0">
+            <a:schemeClr val="accent1"/>
+          </a:effectRef>
+          <a:fontRef idx="minor">
+            <a:schemeClr val="lt1"/>
+          </a:fontRef>
+        </p:style>
+        <p:txBody>
+          <a:bodyPr rtlCol="0" anchor="ctr"/>
+          <a:lstStyle/>
+          <a:p>
+            <a:pPr algn="ctr"/>
+            <a:r>
+              <a:rPr lang="it-IT" sz="2800" dirty="0"/>
+              <a:t>exit</a:t>
+            </a:r>
+            <a:endParaRPr lang="it-IT" dirty="0"/>
+          </a:p>
+        </p:txBody>
+      </p:sp>
+      <p:cxnSp>
+        <p:nvCxnSpPr>
+          <p:cNvPr id="12" name="Connettore 2 11">
+            <a:extLst>
+              <a:ext uri="{FF2B5EF4-FFF2-40B4-BE49-F238E27FC236}">
+                <a16:creationId xmlns:a16="http://schemas.microsoft.com/office/drawing/2014/main" id="{309BB470-7604-484C-BE5D-2119DEF304AE}"/>
+              </a:ext>
+            </a:extLst>
+          </p:cNvPr>
+          <p:cNvCxnSpPr>
+            <a:cxnSpLocks/>
+            <a:stCxn id="4" idx="6"/>
+            <a:endCxn id="5" idx="2"/>
+          </p:cNvCxnSpPr>
+          <p:nvPr/>
+        </p:nvCxnSpPr>
+        <p:spPr>
+          <a:xfrm>
+            <a:off x="4320005" y="3443067"/>
+            <a:ext cx="802522" cy="0"/>
+          </a:xfrm>
+          <a:prstGeom prst="straightConnector1">
+            <a:avLst/>
+          </a:prstGeom>
+          <a:ln w="88900">
+            <a:solidFill>
+              <a:schemeClr val="tx1"/>
+            </a:solidFill>
+            <a:tailEnd type="triangle"/>
+          </a:ln>
+        </p:spPr>
+        <p:style>
+          <a:lnRef idx="1">
+            <a:schemeClr val="accent1"/>
+          </a:lnRef>
+          <a:fillRef idx="0">
+            <a:schemeClr val="accent1"/>
+          </a:fillRef>
+          <a:effectRef idx="0">
+            <a:schemeClr val="accent1"/>
+          </a:effectRef>
+          <a:fontRef idx="minor">
+            <a:schemeClr val="tx1"/>
+          </a:fontRef>
+        </p:style>
+      </p:cxnSp>
+      <p:cxnSp>
+        <p:nvCxnSpPr>
+          <p:cNvPr id="14" name="Connettore 2 13">
+            <a:extLst>
+              <a:ext uri="{FF2B5EF4-FFF2-40B4-BE49-F238E27FC236}">
+                <a16:creationId xmlns:a16="http://schemas.microsoft.com/office/drawing/2014/main" id="{426A4CC2-4B6E-4764-8CE1-641A8BA35523}"/>
+              </a:ext>
+            </a:extLst>
+          </p:cNvPr>
+          <p:cNvCxnSpPr>
+            <a:cxnSpLocks/>
+            <a:stCxn id="5" idx="6"/>
+            <a:endCxn id="6" idx="2"/>
+          </p:cNvCxnSpPr>
+          <p:nvPr/>
+        </p:nvCxnSpPr>
+        <p:spPr>
+          <a:xfrm>
+            <a:off x="7282527" y="3443067"/>
+            <a:ext cx="840038" cy="0"/>
+          </a:xfrm>
+          <a:prstGeom prst="straightConnector1">
+            <a:avLst/>
+          </a:prstGeom>
+          <a:ln w="88900">
+            <a:solidFill>
+              <a:schemeClr val="tx1"/>
+            </a:solidFill>
+            <a:tailEnd type="triangle"/>
+          </a:ln>
+        </p:spPr>
+        <p:style>
+          <a:lnRef idx="1">
+            <a:schemeClr val="accent1"/>
+          </a:lnRef>
+          <a:fillRef idx="0">
+            <a:schemeClr val="accent1"/>
+          </a:fillRef>
+          <a:effectRef idx="0">
+            <a:schemeClr val="accent1"/>
+          </a:effectRef>
+          <a:fontRef idx="minor">
+            <a:schemeClr val="tx1"/>
+          </a:fontRef>
+        </p:style>
+      </p:cxnSp>
+      <p:cxnSp>
+        <p:nvCxnSpPr>
+          <p:cNvPr id="28" name="Connettore 2 27">
+            <a:extLst>
+              <a:ext uri="{FF2B5EF4-FFF2-40B4-BE49-F238E27FC236}">
+                <a16:creationId xmlns:a16="http://schemas.microsoft.com/office/drawing/2014/main" id="{BC72C0E8-66AE-4E2D-9F67-3344895821E5}"/>
+              </a:ext>
+            </a:extLst>
+          </p:cNvPr>
+          <p:cNvCxnSpPr>
+            <a:cxnSpLocks/>
+          </p:cNvCxnSpPr>
+          <p:nvPr/>
+        </p:nvCxnSpPr>
+        <p:spPr>
+          <a:xfrm>
+            <a:off x="918837" y="3460652"/>
+            <a:ext cx="1961168" cy="0"/>
+          </a:xfrm>
+          <a:prstGeom prst="straightConnector1">
+            <a:avLst/>
+          </a:prstGeom>
+          <a:ln w="88900">
+            <a:solidFill>
+              <a:schemeClr val="tx1"/>
+            </a:solidFill>
+            <a:tailEnd type="triangle"/>
+          </a:ln>
+        </p:spPr>
+        <p:style>
+          <a:lnRef idx="1">
+            <a:schemeClr val="accent1"/>
+          </a:lnRef>
+          <a:fillRef idx="0">
+            <a:schemeClr val="accent1"/>
+          </a:fillRef>
+          <a:effectRef idx="0">
+            <a:schemeClr val="accent1"/>
+          </a:effectRef>
+          <a:fontRef idx="minor">
+            <a:schemeClr val="tx1"/>
+          </a:fontRef>
+        </p:style>
+      </p:cxnSp>
+      <p:cxnSp>
+        <p:nvCxnSpPr>
+          <p:cNvPr id="30" name="Connettore 2 29">
+            <a:extLst>
+              <a:ext uri="{FF2B5EF4-FFF2-40B4-BE49-F238E27FC236}">
+                <a16:creationId xmlns:a16="http://schemas.microsoft.com/office/drawing/2014/main" id="{DE38225D-22CD-463A-B01A-63AA80D69B6D}"/>
+              </a:ext>
+            </a:extLst>
+          </p:cNvPr>
+          <p:cNvCxnSpPr>
+            <a:cxnSpLocks/>
+          </p:cNvCxnSpPr>
+          <p:nvPr/>
+        </p:nvCxnSpPr>
+        <p:spPr>
+          <a:xfrm>
+            <a:off x="9562565" y="3443067"/>
+            <a:ext cx="1961168" cy="0"/>
+          </a:xfrm>
+          <a:prstGeom prst="straightConnector1">
+            <a:avLst/>
+          </a:prstGeom>
+          <a:ln w="88900">
+            <a:solidFill>
+              <a:schemeClr val="tx1"/>
+            </a:solidFill>
+            <a:tailEnd type="triangle"/>
+          </a:ln>
+        </p:spPr>
+        <p:style>
+          <a:lnRef idx="1">
+            <a:schemeClr val="accent1"/>
+          </a:lnRef>
+          <a:fillRef idx="0">
+            <a:schemeClr val="accent1"/>
+          </a:fillRef>
+          <a:effectRef idx="0">
+            <a:schemeClr val="accent1"/>
+          </a:effectRef>
+          <a:fontRef idx="minor">
+            <a:schemeClr val="tx1"/>
+          </a:fontRef>
+        </p:style>
+      </p:cxnSp>
+      <p:sp>
+        <p:nvSpPr>
+          <p:cNvPr id="32" name="CasellaDiTesto 31">
+            <a:extLst>
+              <a:ext uri="{FF2B5EF4-FFF2-40B4-BE49-F238E27FC236}">
+                <a16:creationId xmlns:a16="http://schemas.microsoft.com/office/drawing/2014/main" id="{0D64AC4A-55D0-4BCB-8EBA-15893C5227E5}"/>
+              </a:ext>
+            </a:extLst>
+          </p:cNvPr>
+          <p:cNvSpPr txBox="1"/>
+          <p:nvPr/>
+        </p:nvSpPr>
+        <p:spPr>
+          <a:xfrm>
+            <a:off x="4749622" y="1356736"/>
+            <a:ext cx="2952924" cy="646331"/>
+          </a:xfrm>
+          <a:prstGeom prst="rect">
+            <a:avLst/>
+          </a:prstGeom>
+          <a:noFill/>
+        </p:spPr>
+        <p:txBody>
+          <a:bodyPr wrap="square" rtlCol="0">
+            <a:spAutoFit/>
+          </a:bodyPr>
+          <a:lstStyle/>
+          <a:p>
+            <a:pPr algn="ctr"/>
+            <a:r>
+              <a:rPr lang="it-IT" sz="3600" dirty="0" err="1"/>
+              <a:t>exampleState</a:t>
+            </a:r>
+            <a:endParaRPr lang="it-IT" dirty="0"/>
+          </a:p>
+        </p:txBody>
+      </p:sp>
+      <p:sp>
+        <p:nvSpPr>
+          <p:cNvPr id="51" name="Freccia circolare in su 50">
+            <a:extLst>
+              <a:ext uri="{FF2B5EF4-FFF2-40B4-BE49-F238E27FC236}">
+                <a16:creationId xmlns:a16="http://schemas.microsoft.com/office/drawing/2014/main" id="{BABE9ADE-DBFC-4CD8-9125-BD4F93B3FC73}"/>
+              </a:ext>
+            </a:extLst>
+          </p:cNvPr>
+          <p:cNvSpPr/>
+          <p:nvPr/>
+        </p:nvSpPr>
+        <p:spPr>
+          <a:xfrm>
+            <a:off x="5810774" y="4523067"/>
+            <a:ext cx="855677" cy="956345"/>
+          </a:xfrm>
+          <a:prstGeom prst="curvedUpArrow">
+            <a:avLst>
+              <a:gd name="adj1" fmla="val 13382"/>
+              <a:gd name="adj2" fmla="val 50000"/>
+              <a:gd name="adj3" fmla="val 25000"/>
+            </a:avLst>
+          </a:prstGeom>
+          <a:solidFill>
+            <a:schemeClr val="tx1"/>
+          </a:solidFill>
+          <a:ln>
+            <a:solidFill>
+              <a:schemeClr val="tx1"/>
+            </a:solidFill>
+          </a:ln>
+        </p:spPr>
+        <p:style>
+          <a:lnRef idx="2">
+            <a:schemeClr val="accent1">
+              <a:shade val="50000"/>
+            </a:schemeClr>
+          </a:lnRef>
+          <a:fillRef idx="1">
+            <a:schemeClr val="accent1"/>
+          </a:fillRef>
+          <a:effectRef idx="0">
+            <a:schemeClr val="accent1"/>
+          </a:effectRef>
+          <a:fontRef idx="minor">
+            <a:schemeClr val="lt1"/>
+          </a:fontRef>
+        </p:style>
+        <p:txBody>
+          <a:bodyPr rtlCol="0" anchor="ctr"/>
+          <a:lstStyle/>
+          <a:p>
+            <a:pPr algn="ctr"/>
+            <a:endParaRPr lang="it-IT">
+              <a:solidFill>
+                <a:schemeClr val="tx1"/>
+              </a:solidFill>
+            </a:endParaRPr>
+          </a:p>
+        </p:txBody>
+      </p:sp>
+      <p:sp>
+        <p:nvSpPr>
+          <p:cNvPr id="52" name="CasellaDiTesto 51">
+            <a:extLst>
+              <a:ext uri="{FF2B5EF4-FFF2-40B4-BE49-F238E27FC236}">
+                <a16:creationId xmlns:a16="http://schemas.microsoft.com/office/drawing/2014/main" id="{94DD605E-8A98-46D2-B1ED-979057C6B058}"/>
+              </a:ext>
+            </a:extLst>
+          </p:cNvPr>
+          <p:cNvSpPr txBox="1"/>
+          <p:nvPr/>
+        </p:nvSpPr>
+        <p:spPr>
+          <a:xfrm>
+            <a:off x="0" y="2363067"/>
+            <a:ext cx="2436872" cy="954107"/>
+          </a:xfrm>
+          <a:prstGeom prst="rect">
+            <a:avLst/>
+          </a:prstGeom>
+          <a:noFill/>
+        </p:spPr>
+        <p:txBody>
+          <a:bodyPr wrap="square" rtlCol="0">
+            <a:spAutoFit/>
+          </a:bodyPr>
+          <a:lstStyle/>
+          <a:p>
+            <a:pPr algn="ctr"/>
+            <a:r>
+              <a:rPr lang="it-IT" sz="2800" dirty="0" err="1"/>
+              <a:t>Transition</a:t>
+            </a:r>
+            <a:r>
+              <a:rPr lang="it-IT" sz="2800" dirty="0"/>
+              <a:t> from </a:t>
+            </a:r>
+            <a:r>
+              <a:rPr lang="it-IT" sz="2800" dirty="0" err="1"/>
+              <a:t>previous</a:t>
+            </a:r>
+            <a:r>
+              <a:rPr lang="it-IT" sz="2800" dirty="0"/>
+              <a:t> state</a:t>
+            </a:r>
+          </a:p>
+        </p:txBody>
+      </p:sp>
+      <p:sp>
+        <p:nvSpPr>
+          <p:cNvPr id="53" name="CasellaDiTesto 52">
+            <a:extLst>
+              <a:ext uri="{FF2B5EF4-FFF2-40B4-BE49-F238E27FC236}">
+                <a16:creationId xmlns:a16="http://schemas.microsoft.com/office/drawing/2014/main" id="{FF3C360B-CE1D-47CE-AA93-25852622EBB6}"/>
+              </a:ext>
+            </a:extLst>
+          </p:cNvPr>
+          <p:cNvSpPr txBox="1"/>
+          <p:nvPr/>
+        </p:nvSpPr>
+        <p:spPr>
+          <a:xfrm>
+            <a:off x="9882231" y="2246013"/>
+            <a:ext cx="2309769" cy="954107"/>
+          </a:xfrm>
+          <a:prstGeom prst="rect">
+            <a:avLst/>
+          </a:prstGeom>
+          <a:noFill/>
+        </p:spPr>
+        <p:txBody>
+          <a:bodyPr wrap="square" rtlCol="0">
+            <a:spAutoFit/>
+          </a:bodyPr>
+          <a:lstStyle/>
+          <a:p>
+            <a:pPr algn="ctr"/>
+            <a:r>
+              <a:rPr lang="it-IT" sz="2800" dirty="0" err="1"/>
+              <a:t>Transition</a:t>
+            </a:r>
+            <a:r>
+              <a:rPr lang="it-IT" sz="2800" dirty="0"/>
+              <a:t> to </a:t>
+            </a:r>
+            <a:r>
+              <a:rPr lang="it-IT" sz="2800" dirty="0" err="1"/>
+              <a:t>next</a:t>
+            </a:r>
+            <a:r>
+              <a:rPr lang="it-IT" sz="2800" dirty="0"/>
+              <a:t> state</a:t>
+            </a:r>
+          </a:p>
+        </p:txBody>
+      </p:sp>
+    </p:spTree>
+    <p:extLst>
+      <p:ext uri="{BB962C8B-B14F-4D97-AF65-F5344CB8AC3E}">
+        <p14:creationId xmlns:p14="http://schemas.microsoft.com/office/powerpoint/2010/main" val="1624972551"/>
+      </p:ext>
+    </p:extLst>
+  </p:cSld>
+  <p:clrMapOvr>
+    <a:masterClrMapping/>
+  </p:clrMapOvr>
+</p:sld>
+</file>
+
 <file path=ppt/theme/theme1.xml><?xml version="1.0" encoding="utf-8"?>
 <a:theme xmlns:a="http://schemas.openxmlformats.org/drawingml/2006/main" name="Tema di Office">
   <a:themeElements>

</xml_diff>